<commit_message>
Deployed b3ea33c with MkDocs version: 1.1.2
</commit_message>
<xml_diff>
--- a/lesson04b/figures/sched.pptx
+++ b/lesson04b/figures/sched.pptx
@@ -278,7 +278,7 @@
           <a:p>
             <a:fld id="{6F3343BF-7104-41BB-9DE2-F81E2A7FAF60}" type="datetimeFigureOut">
               <a:rPr lang="en-US" smtClean="0"/>
-              <a:t>6/20/2020</a:t>
+              <a:t>3/4/2021</a:t>
             </a:fld>
             <a:endParaRPr lang="en-US"/>
           </a:p>
@@ -476,7 +476,7 @@
           <a:p>
             <a:fld id="{6F3343BF-7104-41BB-9DE2-F81E2A7FAF60}" type="datetimeFigureOut">
               <a:rPr lang="en-US" smtClean="0"/>
-              <a:t>6/20/2020</a:t>
+              <a:t>3/4/2021</a:t>
             </a:fld>
             <a:endParaRPr lang="en-US"/>
           </a:p>
@@ -684,7 +684,7 @@
           <a:p>
             <a:fld id="{6F3343BF-7104-41BB-9DE2-F81E2A7FAF60}" type="datetimeFigureOut">
               <a:rPr lang="en-US" smtClean="0"/>
-              <a:t>6/20/2020</a:t>
+              <a:t>3/4/2021</a:t>
             </a:fld>
             <a:endParaRPr lang="en-US"/>
           </a:p>
@@ -1492,7 +1492,7 @@
           <a:p>
             <a:fld id="{6F3343BF-7104-41BB-9DE2-F81E2A7FAF60}" type="datetimeFigureOut">
               <a:rPr lang="en-US" smtClean="0"/>
-              <a:t>6/20/2020</a:t>
+              <a:t>3/4/2021</a:t>
             </a:fld>
             <a:endParaRPr lang="en-US"/>
           </a:p>
@@ -1787,7 +1787,7 @@
           <a:p>
             <a:fld id="{6F3343BF-7104-41BB-9DE2-F81E2A7FAF60}" type="datetimeFigureOut">
               <a:rPr lang="en-US" smtClean="0"/>
-              <a:t>6/20/2020</a:t>
+              <a:t>3/4/2021</a:t>
             </a:fld>
             <a:endParaRPr lang="en-US"/>
           </a:p>
@@ -2052,7 +2052,7 @@
           <a:p>
             <a:fld id="{6F3343BF-7104-41BB-9DE2-F81E2A7FAF60}" type="datetimeFigureOut">
               <a:rPr lang="en-US" smtClean="0"/>
-              <a:t>6/20/2020</a:t>
+              <a:t>3/4/2021</a:t>
             </a:fld>
             <a:endParaRPr lang="en-US"/>
           </a:p>
@@ -2464,7 +2464,7 @@
           <a:p>
             <a:fld id="{6F3343BF-7104-41BB-9DE2-F81E2A7FAF60}" type="datetimeFigureOut">
               <a:rPr lang="en-US" smtClean="0"/>
-              <a:t>6/20/2020</a:t>
+              <a:t>3/4/2021</a:t>
             </a:fld>
             <a:endParaRPr lang="en-US"/>
           </a:p>
@@ -2605,7 +2605,7 @@
           <a:p>
             <a:fld id="{6F3343BF-7104-41BB-9DE2-F81E2A7FAF60}" type="datetimeFigureOut">
               <a:rPr lang="en-US" smtClean="0"/>
-              <a:t>6/20/2020</a:t>
+              <a:t>3/4/2021</a:t>
             </a:fld>
             <a:endParaRPr lang="en-US"/>
           </a:p>
@@ -2718,7 +2718,7 @@
           <a:p>
             <a:fld id="{6F3343BF-7104-41BB-9DE2-F81E2A7FAF60}" type="datetimeFigureOut">
               <a:rPr lang="en-US" smtClean="0"/>
-              <a:t>6/20/2020</a:t>
+              <a:t>3/4/2021</a:t>
             </a:fld>
             <a:endParaRPr lang="en-US"/>
           </a:p>
@@ -3029,7 +3029,7 @@
           <a:p>
             <a:fld id="{6F3343BF-7104-41BB-9DE2-F81E2A7FAF60}" type="datetimeFigureOut">
               <a:rPr lang="en-US" smtClean="0"/>
-              <a:t>6/20/2020</a:t>
+              <a:t>3/4/2021</a:t>
             </a:fld>
             <a:endParaRPr lang="en-US"/>
           </a:p>
@@ -3320,7 +3320,7 @@
           <a:p>
             <a:fld id="{6F3343BF-7104-41BB-9DE2-F81E2A7FAF60}" type="datetimeFigureOut">
               <a:rPr lang="en-US" smtClean="0"/>
-              <a:t>6/20/2020</a:t>
+              <a:t>3/4/2021</a:t>
             </a:fld>
             <a:endParaRPr lang="en-US"/>
           </a:p>
@@ -3566,7 +3566,7 @@
           <a:p>
             <a:fld id="{6F3343BF-7104-41BB-9DE2-F81E2A7FAF60}" type="datetimeFigureOut">
               <a:rPr lang="en-US" smtClean="0"/>
-              <a:t>6/20/2020</a:t>
+              <a:t>3/4/2021</a:t>
             </a:fld>
             <a:endParaRPr lang="en-US"/>
           </a:p>
@@ -5566,6 +5566,78 @@
           </a:p>
         </p:txBody>
       </p:sp>
+      <p:sp>
+        <p:nvSpPr>
+          <p:cNvPr id="26" name="TextBox 25">
+            <a:extLst>
+              <a:ext uri="{FF2B5EF4-FFF2-40B4-BE49-F238E27FC236}">
+                <a16:creationId xmlns:a16="http://schemas.microsoft.com/office/drawing/2014/main" id="{D7509D42-6C8F-4F67-B6F5-C629B745CE3F}"/>
+              </a:ext>
+            </a:extLst>
+          </p:cNvPr>
+          <p:cNvSpPr txBox="1"/>
+          <p:nvPr/>
+        </p:nvSpPr>
+        <p:spPr>
+          <a:xfrm>
+            <a:off x="4419600" y="1489594"/>
+            <a:ext cx="1600200" cy="369332"/>
+          </a:xfrm>
+          <a:prstGeom prst="rect">
+            <a:avLst/>
+          </a:prstGeom>
+          <a:noFill/>
+        </p:spPr>
+        <p:txBody>
+          <a:bodyPr wrap="square" rtlCol="0">
+            <a:spAutoFit/>
+          </a:bodyPr>
+          <a:lstStyle/>
+          <a:p>
+            <a:pPr algn="r"/>
+            <a:r>
+              <a:rPr lang="en-US" dirty="0"/>
+              <a:t>0x0040:1000</a:t>
+            </a:r>
+          </a:p>
+        </p:txBody>
+      </p:sp>
+      <p:sp>
+        <p:nvSpPr>
+          <p:cNvPr id="27" name="TextBox 26">
+            <a:extLst>
+              <a:ext uri="{FF2B5EF4-FFF2-40B4-BE49-F238E27FC236}">
+                <a16:creationId xmlns:a16="http://schemas.microsoft.com/office/drawing/2014/main" id="{43992E58-7E9D-42D0-AB40-97169E3FC268}"/>
+              </a:ext>
+            </a:extLst>
+          </p:cNvPr>
+          <p:cNvSpPr txBox="1"/>
+          <p:nvPr/>
+        </p:nvSpPr>
+        <p:spPr>
+          <a:xfrm>
+            <a:off x="6559683" y="1456608"/>
+            <a:ext cx="1600200" cy="369332"/>
+          </a:xfrm>
+          <a:prstGeom prst="rect">
+            <a:avLst/>
+          </a:prstGeom>
+          <a:noFill/>
+        </p:spPr>
+        <p:txBody>
+          <a:bodyPr wrap="square" rtlCol="0">
+            <a:spAutoFit/>
+          </a:bodyPr>
+          <a:lstStyle/>
+          <a:p>
+            <a:pPr algn="r"/>
+            <a:r>
+              <a:rPr lang="en-US" dirty="0"/>
+              <a:t>0x0040:2000</a:t>
+            </a:r>
+          </a:p>
+        </p:txBody>
+      </p:sp>
     </p:spTree>
     <p:extLst>
       <p:ext uri="{BB962C8B-B14F-4D97-AF65-F5344CB8AC3E}">
@@ -6231,6 +6303,78 @@
           </a:p>
         </p:txBody>
       </p:sp>
+      <p:sp>
+        <p:nvSpPr>
+          <p:cNvPr id="17" name="TextBox 16">
+            <a:extLst>
+              <a:ext uri="{FF2B5EF4-FFF2-40B4-BE49-F238E27FC236}">
+                <a16:creationId xmlns:a16="http://schemas.microsoft.com/office/drawing/2014/main" id="{E5B9914A-1FF5-4637-8928-1811C05E3A55}"/>
+              </a:ext>
+            </a:extLst>
+          </p:cNvPr>
+          <p:cNvSpPr txBox="1"/>
+          <p:nvPr/>
+        </p:nvSpPr>
+        <p:spPr>
+          <a:xfrm>
+            <a:off x="220980" y="2749034"/>
+            <a:ext cx="1600200" cy="369332"/>
+          </a:xfrm>
+          <a:prstGeom prst="rect">
+            <a:avLst/>
+          </a:prstGeom>
+          <a:noFill/>
+        </p:spPr>
+        <p:txBody>
+          <a:bodyPr wrap="square" rtlCol="0">
+            <a:spAutoFit/>
+          </a:bodyPr>
+          <a:lstStyle/>
+          <a:p>
+            <a:pPr algn="r"/>
+            <a:r>
+              <a:rPr lang="en-US" dirty="0"/>
+              <a:t>0x0040:1000</a:t>
+            </a:r>
+          </a:p>
+        </p:txBody>
+      </p:sp>
+      <p:sp>
+        <p:nvSpPr>
+          <p:cNvPr id="20" name="TextBox 19">
+            <a:extLst>
+              <a:ext uri="{FF2B5EF4-FFF2-40B4-BE49-F238E27FC236}">
+                <a16:creationId xmlns:a16="http://schemas.microsoft.com/office/drawing/2014/main" id="{80B54AEA-AE38-40E6-BD23-65B536DF385E}"/>
+              </a:ext>
+            </a:extLst>
+          </p:cNvPr>
+          <p:cNvSpPr txBox="1"/>
+          <p:nvPr/>
+        </p:nvSpPr>
+        <p:spPr>
+          <a:xfrm>
+            <a:off x="4419600" y="1489594"/>
+            <a:ext cx="1600200" cy="369332"/>
+          </a:xfrm>
+          <a:prstGeom prst="rect">
+            <a:avLst/>
+          </a:prstGeom>
+          <a:noFill/>
+        </p:spPr>
+        <p:txBody>
+          <a:bodyPr wrap="square" rtlCol="0">
+            <a:spAutoFit/>
+          </a:bodyPr>
+          <a:lstStyle/>
+          <a:p>
+            <a:pPr algn="r"/>
+            <a:r>
+              <a:rPr lang="en-US" dirty="0"/>
+              <a:t>0x0040:1000</a:t>
+            </a:r>
+          </a:p>
+        </p:txBody>
+      </p:sp>
     </p:spTree>
     <p:extLst>
       <p:ext uri="{BB962C8B-B14F-4D97-AF65-F5344CB8AC3E}">
@@ -7119,6 +7263,114 @@
           </a:p>
         </p:txBody>
       </p:sp>
+      <p:sp>
+        <p:nvSpPr>
+          <p:cNvPr id="22" name="TextBox 21">
+            <a:extLst>
+              <a:ext uri="{FF2B5EF4-FFF2-40B4-BE49-F238E27FC236}">
+                <a16:creationId xmlns:a16="http://schemas.microsoft.com/office/drawing/2014/main" id="{A1F7C87E-294F-411A-876E-9B0F30BFD7E7}"/>
+              </a:ext>
+            </a:extLst>
+          </p:cNvPr>
+          <p:cNvSpPr txBox="1"/>
+          <p:nvPr/>
+        </p:nvSpPr>
+        <p:spPr>
+          <a:xfrm>
+            <a:off x="212977" y="2351910"/>
+            <a:ext cx="1600200" cy="369332"/>
+          </a:xfrm>
+          <a:prstGeom prst="rect">
+            <a:avLst/>
+          </a:prstGeom>
+          <a:noFill/>
+        </p:spPr>
+        <p:txBody>
+          <a:bodyPr wrap="square" rtlCol="0">
+            <a:spAutoFit/>
+          </a:bodyPr>
+          <a:lstStyle/>
+          <a:p>
+            <a:pPr algn="r"/>
+            <a:r>
+              <a:rPr lang="en-US" dirty="0"/>
+              <a:t>0x0040:2000</a:t>
+            </a:r>
+          </a:p>
+        </p:txBody>
+      </p:sp>
+      <p:sp>
+        <p:nvSpPr>
+          <p:cNvPr id="25" name="TextBox 24">
+            <a:extLst>
+              <a:ext uri="{FF2B5EF4-FFF2-40B4-BE49-F238E27FC236}">
+                <a16:creationId xmlns:a16="http://schemas.microsoft.com/office/drawing/2014/main" id="{EAB949B6-7D7D-414F-8BA4-7DFBF73831AC}"/>
+              </a:ext>
+            </a:extLst>
+          </p:cNvPr>
+          <p:cNvSpPr txBox="1"/>
+          <p:nvPr/>
+        </p:nvSpPr>
+        <p:spPr>
+          <a:xfrm>
+            <a:off x="4419600" y="1489594"/>
+            <a:ext cx="1600200" cy="369332"/>
+          </a:xfrm>
+          <a:prstGeom prst="rect">
+            <a:avLst/>
+          </a:prstGeom>
+          <a:noFill/>
+        </p:spPr>
+        <p:txBody>
+          <a:bodyPr wrap="square" rtlCol="0">
+            <a:spAutoFit/>
+          </a:bodyPr>
+          <a:lstStyle/>
+          <a:p>
+            <a:pPr algn="r"/>
+            <a:r>
+              <a:rPr lang="en-US" dirty="0"/>
+              <a:t>0x0040:1000</a:t>
+            </a:r>
+          </a:p>
+        </p:txBody>
+      </p:sp>
+      <p:sp>
+        <p:nvSpPr>
+          <p:cNvPr id="26" name="TextBox 25">
+            <a:extLst>
+              <a:ext uri="{FF2B5EF4-FFF2-40B4-BE49-F238E27FC236}">
+                <a16:creationId xmlns:a16="http://schemas.microsoft.com/office/drawing/2014/main" id="{7C783455-BC30-4061-AB59-01730DD0A3B9}"/>
+              </a:ext>
+            </a:extLst>
+          </p:cNvPr>
+          <p:cNvSpPr txBox="1"/>
+          <p:nvPr/>
+        </p:nvSpPr>
+        <p:spPr>
+          <a:xfrm>
+            <a:off x="6559683" y="1456608"/>
+            <a:ext cx="1600200" cy="369332"/>
+          </a:xfrm>
+          <a:prstGeom prst="rect">
+            <a:avLst/>
+          </a:prstGeom>
+          <a:noFill/>
+        </p:spPr>
+        <p:txBody>
+          <a:bodyPr wrap="square" rtlCol="0">
+            <a:spAutoFit/>
+          </a:bodyPr>
+          <a:lstStyle/>
+          <a:p>
+            <a:pPr algn="r"/>
+            <a:r>
+              <a:rPr lang="en-US" dirty="0"/>
+              <a:t>0x0040:2000</a:t>
+            </a:r>
+          </a:p>
+        </p:txBody>
+      </p:sp>
     </p:spTree>
     <p:extLst>
       <p:ext uri="{BB962C8B-B14F-4D97-AF65-F5344CB8AC3E}">
@@ -8076,7 +8328,7 @@
         </p:nvSpPr>
         <p:spPr>
           <a:xfrm>
-            <a:off x="3816986" y="1489594"/>
+            <a:off x="4419600" y="1489594"/>
             <a:ext cx="1600200" cy="369332"/>
           </a:xfrm>
           <a:prstGeom prst="rect">
@@ -8094,6 +8346,78 @@
             <a:r>
               <a:rPr lang="en-US" dirty="0"/>
               <a:t>0x0040:1000</a:t>
+            </a:r>
+          </a:p>
+        </p:txBody>
+      </p:sp>
+      <p:sp>
+        <p:nvSpPr>
+          <p:cNvPr id="26" name="TextBox 25">
+            <a:extLst>
+              <a:ext uri="{FF2B5EF4-FFF2-40B4-BE49-F238E27FC236}">
+                <a16:creationId xmlns:a16="http://schemas.microsoft.com/office/drawing/2014/main" id="{2E1328CA-FCA5-4408-80E0-93CA73FA5C10}"/>
+              </a:ext>
+            </a:extLst>
+          </p:cNvPr>
+          <p:cNvSpPr txBox="1"/>
+          <p:nvPr/>
+        </p:nvSpPr>
+        <p:spPr>
+          <a:xfrm>
+            <a:off x="212977" y="2351910"/>
+            <a:ext cx="1600200" cy="369332"/>
+          </a:xfrm>
+          <a:prstGeom prst="rect">
+            <a:avLst/>
+          </a:prstGeom>
+          <a:noFill/>
+        </p:spPr>
+        <p:txBody>
+          <a:bodyPr wrap="square" rtlCol="0">
+            <a:spAutoFit/>
+          </a:bodyPr>
+          <a:lstStyle/>
+          <a:p>
+            <a:pPr algn="r"/>
+            <a:r>
+              <a:rPr lang="en-US" dirty="0"/>
+              <a:t>0x0040:2000</a:t>
+            </a:r>
+          </a:p>
+        </p:txBody>
+      </p:sp>
+      <p:sp>
+        <p:nvSpPr>
+          <p:cNvPr id="27" name="TextBox 26">
+            <a:extLst>
+              <a:ext uri="{FF2B5EF4-FFF2-40B4-BE49-F238E27FC236}">
+                <a16:creationId xmlns:a16="http://schemas.microsoft.com/office/drawing/2014/main" id="{4D1E4F38-C342-4D64-A8D1-B2B7847DBEAF}"/>
+              </a:ext>
+            </a:extLst>
+          </p:cNvPr>
+          <p:cNvSpPr txBox="1"/>
+          <p:nvPr/>
+        </p:nvSpPr>
+        <p:spPr>
+          <a:xfrm>
+            <a:off x="6559683" y="1456608"/>
+            <a:ext cx="1600200" cy="369332"/>
+          </a:xfrm>
+          <a:prstGeom prst="rect">
+            <a:avLst/>
+          </a:prstGeom>
+          <a:noFill/>
+        </p:spPr>
+        <p:txBody>
+          <a:bodyPr wrap="square" rtlCol="0">
+            <a:spAutoFit/>
+          </a:bodyPr>
+          <a:lstStyle/>
+          <a:p>
+            <a:pPr algn="r"/>
+            <a:r>
+              <a:rPr lang="en-US" dirty="0"/>
+              <a:t>0x0040:2000</a:t>
             </a:r>
           </a:p>
         </p:txBody>
@@ -9184,6 +9508,78 @@
           </a:p>
         </p:txBody>
       </p:sp>
+      <p:sp>
+        <p:nvSpPr>
+          <p:cNvPr id="28" name="TextBox 27">
+            <a:extLst>
+              <a:ext uri="{FF2B5EF4-FFF2-40B4-BE49-F238E27FC236}">
+                <a16:creationId xmlns:a16="http://schemas.microsoft.com/office/drawing/2014/main" id="{20AAA77D-08B2-4683-8A23-A88488B0F627}"/>
+              </a:ext>
+            </a:extLst>
+          </p:cNvPr>
+          <p:cNvSpPr txBox="1"/>
+          <p:nvPr/>
+        </p:nvSpPr>
+        <p:spPr>
+          <a:xfrm>
+            <a:off x="4419600" y="1489594"/>
+            <a:ext cx="1600200" cy="369332"/>
+          </a:xfrm>
+          <a:prstGeom prst="rect">
+            <a:avLst/>
+          </a:prstGeom>
+          <a:noFill/>
+        </p:spPr>
+        <p:txBody>
+          <a:bodyPr wrap="square" rtlCol="0">
+            <a:spAutoFit/>
+          </a:bodyPr>
+          <a:lstStyle/>
+          <a:p>
+            <a:pPr algn="r"/>
+            <a:r>
+              <a:rPr lang="en-US" dirty="0"/>
+              <a:t>0x0040:1000</a:t>
+            </a:r>
+          </a:p>
+        </p:txBody>
+      </p:sp>
+      <p:sp>
+        <p:nvSpPr>
+          <p:cNvPr id="29" name="TextBox 28">
+            <a:extLst>
+              <a:ext uri="{FF2B5EF4-FFF2-40B4-BE49-F238E27FC236}">
+                <a16:creationId xmlns:a16="http://schemas.microsoft.com/office/drawing/2014/main" id="{2104DACC-52D4-4BCE-9340-1CD1EB54B56D}"/>
+              </a:ext>
+            </a:extLst>
+          </p:cNvPr>
+          <p:cNvSpPr txBox="1"/>
+          <p:nvPr/>
+        </p:nvSpPr>
+        <p:spPr>
+          <a:xfrm>
+            <a:off x="6559683" y="1456608"/>
+            <a:ext cx="1600200" cy="369332"/>
+          </a:xfrm>
+          <a:prstGeom prst="rect">
+            <a:avLst/>
+          </a:prstGeom>
+          <a:noFill/>
+        </p:spPr>
+        <p:txBody>
+          <a:bodyPr wrap="square" rtlCol="0">
+            <a:spAutoFit/>
+          </a:bodyPr>
+          <a:lstStyle/>
+          <a:p>
+            <a:pPr algn="r"/>
+            <a:r>
+              <a:rPr lang="en-US" dirty="0"/>
+              <a:t>0x0040:2000</a:t>
+            </a:r>
+          </a:p>
+        </p:txBody>
+      </p:sp>
     </p:spTree>
     <p:extLst>
       <p:ext uri="{BB962C8B-B14F-4D97-AF65-F5344CB8AC3E}">
@@ -10356,6 +10752,78 @@
           </a:p>
         </p:txBody>
       </p:sp>
+      <p:sp>
+        <p:nvSpPr>
+          <p:cNvPr id="31" name="TextBox 30">
+            <a:extLst>
+              <a:ext uri="{FF2B5EF4-FFF2-40B4-BE49-F238E27FC236}">
+                <a16:creationId xmlns:a16="http://schemas.microsoft.com/office/drawing/2014/main" id="{14FEFB72-D1AE-44B8-A76B-527215E0E5B4}"/>
+              </a:ext>
+            </a:extLst>
+          </p:cNvPr>
+          <p:cNvSpPr txBox="1"/>
+          <p:nvPr/>
+        </p:nvSpPr>
+        <p:spPr>
+          <a:xfrm>
+            <a:off x="4419600" y="1489594"/>
+            <a:ext cx="1600200" cy="369332"/>
+          </a:xfrm>
+          <a:prstGeom prst="rect">
+            <a:avLst/>
+          </a:prstGeom>
+          <a:noFill/>
+        </p:spPr>
+        <p:txBody>
+          <a:bodyPr wrap="square" rtlCol="0">
+            <a:spAutoFit/>
+          </a:bodyPr>
+          <a:lstStyle/>
+          <a:p>
+            <a:pPr algn="r"/>
+            <a:r>
+              <a:rPr lang="en-US" dirty="0"/>
+              <a:t>0x0040:1000</a:t>
+            </a:r>
+          </a:p>
+        </p:txBody>
+      </p:sp>
+      <p:sp>
+        <p:nvSpPr>
+          <p:cNvPr id="32" name="TextBox 31">
+            <a:extLst>
+              <a:ext uri="{FF2B5EF4-FFF2-40B4-BE49-F238E27FC236}">
+                <a16:creationId xmlns:a16="http://schemas.microsoft.com/office/drawing/2014/main" id="{B6E48D5A-4A1D-4555-93A3-23B5F0868EAA}"/>
+              </a:ext>
+            </a:extLst>
+          </p:cNvPr>
+          <p:cNvSpPr txBox="1"/>
+          <p:nvPr/>
+        </p:nvSpPr>
+        <p:spPr>
+          <a:xfrm>
+            <a:off x="6559683" y="1456608"/>
+            <a:ext cx="1600200" cy="369332"/>
+          </a:xfrm>
+          <a:prstGeom prst="rect">
+            <a:avLst/>
+          </a:prstGeom>
+          <a:noFill/>
+        </p:spPr>
+        <p:txBody>
+          <a:bodyPr wrap="square" rtlCol="0">
+            <a:spAutoFit/>
+          </a:bodyPr>
+          <a:lstStyle/>
+          <a:p>
+            <a:pPr algn="r"/>
+            <a:r>
+              <a:rPr lang="en-US" dirty="0"/>
+              <a:t>0x0040:2000</a:t>
+            </a:r>
+          </a:p>
+        </p:txBody>
+      </p:sp>
     </p:spTree>
     <p:extLst>
       <p:ext uri="{BB962C8B-B14F-4D97-AF65-F5344CB8AC3E}">
@@ -11654,6 +12122,78 @@
           </a:p>
         </p:txBody>
       </p:sp>
+      <p:sp>
+        <p:nvSpPr>
+          <p:cNvPr id="32" name="TextBox 31">
+            <a:extLst>
+              <a:ext uri="{FF2B5EF4-FFF2-40B4-BE49-F238E27FC236}">
+                <a16:creationId xmlns:a16="http://schemas.microsoft.com/office/drawing/2014/main" id="{5D85601A-78A6-43E3-B41B-218498B0EF12}"/>
+              </a:ext>
+            </a:extLst>
+          </p:cNvPr>
+          <p:cNvSpPr txBox="1"/>
+          <p:nvPr/>
+        </p:nvSpPr>
+        <p:spPr>
+          <a:xfrm>
+            <a:off x="4419600" y="1489594"/>
+            <a:ext cx="1600200" cy="369332"/>
+          </a:xfrm>
+          <a:prstGeom prst="rect">
+            <a:avLst/>
+          </a:prstGeom>
+          <a:noFill/>
+        </p:spPr>
+        <p:txBody>
+          <a:bodyPr wrap="square" rtlCol="0">
+            <a:spAutoFit/>
+          </a:bodyPr>
+          <a:lstStyle/>
+          <a:p>
+            <a:pPr algn="r"/>
+            <a:r>
+              <a:rPr lang="en-US" dirty="0"/>
+              <a:t>0x0040:1000</a:t>
+            </a:r>
+          </a:p>
+        </p:txBody>
+      </p:sp>
+      <p:sp>
+        <p:nvSpPr>
+          <p:cNvPr id="33" name="TextBox 32">
+            <a:extLst>
+              <a:ext uri="{FF2B5EF4-FFF2-40B4-BE49-F238E27FC236}">
+                <a16:creationId xmlns:a16="http://schemas.microsoft.com/office/drawing/2014/main" id="{F8FCD961-EC9D-4642-A716-E4678EAFB64B}"/>
+              </a:ext>
+            </a:extLst>
+          </p:cNvPr>
+          <p:cNvSpPr txBox="1"/>
+          <p:nvPr/>
+        </p:nvSpPr>
+        <p:spPr>
+          <a:xfrm>
+            <a:off x="6559683" y="1456608"/>
+            <a:ext cx="1600200" cy="369332"/>
+          </a:xfrm>
+          <a:prstGeom prst="rect">
+            <a:avLst/>
+          </a:prstGeom>
+          <a:noFill/>
+        </p:spPr>
+        <p:txBody>
+          <a:bodyPr wrap="square" rtlCol="0">
+            <a:spAutoFit/>
+          </a:bodyPr>
+          <a:lstStyle/>
+          <a:p>
+            <a:pPr algn="r"/>
+            <a:r>
+              <a:rPr lang="en-US" dirty="0"/>
+              <a:t>0x0040:2000</a:t>
+            </a:r>
+          </a:p>
+        </p:txBody>
+      </p:sp>
     </p:spTree>
     <p:extLst>
       <p:ext uri="{BB962C8B-B14F-4D97-AF65-F5344CB8AC3E}">
@@ -12982,6 +13522,78 @@
           </a:p>
         </p:txBody>
       </p:sp>
+      <p:sp>
+        <p:nvSpPr>
+          <p:cNvPr id="28" name="TextBox 27">
+            <a:extLst>
+              <a:ext uri="{FF2B5EF4-FFF2-40B4-BE49-F238E27FC236}">
+                <a16:creationId xmlns:a16="http://schemas.microsoft.com/office/drawing/2014/main" id="{DD8C886B-EB58-485A-B15C-7731C400D005}"/>
+              </a:ext>
+            </a:extLst>
+          </p:cNvPr>
+          <p:cNvSpPr txBox="1"/>
+          <p:nvPr/>
+        </p:nvSpPr>
+        <p:spPr>
+          <a:xfrm>
+            <a:off x="4419600" y="1489594"/>
+            <a:ext cx="1600200" cy="369332"/>
+          </a:xfrm>
+          <a:prstGeom prst="rect">
+            <a:avLst/>
+          </a:prstGeom>
+          <a:noFill/>
+        </p:spPr>
+        <p:txBody>
+          <a:bodyPr wrap="square" rtlCol="0">
+            <a:spAutoFit/>
+          </a:bodyPr>
+          <a:lstStyle/>
+          <a:p>
+            <a:pPr algn="r"/>
+            <a:r>
+              <a:rPr lang="en-US" dirty="0"/>
+              <a:t>0x0040:1000</a:t>
+            </a:r>
+          </a:p>
+        </p:txBody>
+      </p:sp>
+      <p:sp>
+        <p:nvSpPr>
+          <p:cNvPr id="33" name="TextBox 32">
+            <a:extLst>
+              <a:ext uri="{FF2B5EF4-FFF2-40B4-BE49-F238E27FC236}">
+                <a16:creationId xmlns:a16="http://schemas.microsoft.com/office/drawing/2014/main" id="{A88EB6AE-4A44-4038-93B9-BCC3A3C5F0E8}"/>
+              </a:ext>
+            </a:extLst>
+          </p:cNvPr>
+          <p:cNvSpPr txBox="1"/>
+          <p:nvPr/>
+        </p:nvSpPr>
+        <p:spPr>
+          <a:xfrm>
+            <a:off x="6559683" y="1456608"/>
+            <a:ext cx="1600200" cy="369332"/>
+          </a:xfrm>
+          <a:prstGeom prst="rect">
+            <a:avLst/>
+          </a:prstGeom>
+          <a:noFill/>
+        </p:spPr>
+        <p:txBody>
+          <a:bodyPr wrap="square" rtlCol="0">
+            <a:spAutoFit/>
+          </a:bodyPr>
+          <a:lstStyle/>
+          <a:p>
+            <a:pPr algn="r"/>
+            <a:r>
+              <a:rPr lang="en-US" dirty="0"/>
+              <a:t>0x0040:2000</a:t>
+            </a:r>
+          </a:p>
+        </p:txBody>
+      </p:sp>
     </p:spTree>
     <p:extLst>
       <p:ext uri="{BB962C8B-B14F-4D97-AF65-F5344CB8AC3E}">
@@ -14205,6 +14817,78 @@
           <a:p>
             <a:pPr algn="ctr"/>
             <a:endParaRPr lang="en-US" dirty="0"/>
+          </a:p>
+        </p:txBody>
+      </p:sp>
+      <p:sp>
+        <p:nvSpPr>
+          <p:cNvPr id="25" name="TextBox 24">
+            <a:extLst>
+              <a:ext uri="{FF2B5EF4-FFF2-40B4-BE49-F238E27FC236}">
+                <a16:creationId xmlns:a16="http://schemas.microsoft.com/office/drawing/2014/main" id="{A037317B-F9D8-48B2-913D-EBB32C41D105}"/>
+              </a:ext>
+            </a:extLst>
+          </p:cNvPr>
+          <p:cNvSpPr txBox="1"/>
+          <p:nvPr/>
+        </p:nvSpPr>
+        <p:spPr>
+          <a:xfrm>
+            <a:off x="4419600" y="1489594"/>
+            <a:ext cx="1600200" cy="369332"/>
+          </a:xfrm>
+          <a:prstGeom prst="rect">
+            <a:avLst/>
+          </a:prstGeom>
+          <a:noFill/>
+        </p:spPr>
+        <p:txBody>
+          <a:bodyPr wrap="square" rtlCol="0">
+            <a:spAutoFit/>
+          </a:bodyPr>
+          <a:lstStyle/>
+          <a:p>
+            <a:pPr algn="r"/>
+            <a:r>
+              <a:rPr lang="en-US" dirty="0"/>
+              <a:t>0x0040:1000</a:t>
+            </a:r>
+          </a:p>
+        </p:txBody>
+      </p:sp>
+      <p:sp>
+        <p:nvSpPr>
+          <p:cNvPr id="27" name="TextBox 26">
+            <a:extLst>
+              <a:ext uri="{FF2B5EF4-FFF2-40B4-BE49-F238E27FC236}">
+                <a16:creationId xmlns:a16="http://schemas.microsoft.com/office/drawing/2014/main" id="{B568A726-8E00-4C56-ADA7-CD00262C3A90}"/>
+              </a:ext>
+            </a:extLst>
+          </p:cNvPr>
+          <p:cNvSpPr txBox="1"/>
+          <p:nvPr/>
+        </p:nvSpPr>
+        <p:spPr>
+          <a:xfrm>
+            <a:off x="6559683" y="1456608"/>
+            <a:ext cx="1600200" cy="369332"/>
+          </a:xfrm>
+          <a:prstGeom prst="rect">
+            <a:avLst/>
+          </a:prstGeom>
+          <a:noFill/>
+        </p:spPr>
+        <p:txBody>
+          <a:bodyPr wrap="square" rtlCol="0">
+            <a:spAutoFit/>
+          </a:bodyPr>
+          <a:lstStyle/>
+          <a:p>
+            <a:pPr algn="r"/>
+            <a:r>
+              <a:rPr lang="en-US" dirty="0"/>
+              <a:t>0x0040:2000</a:t>
+            </a:r>
           </a:p>
         </p:txBody>
       </p:sp>

</xml_diff>